<commit_message>
Minor changes in the PhD Day slides
</commit_message>
<xml_diff>
--- a/Presentations/210907 PhD Day.pptx
+++ b/Presentations/210907 PhD Day.pptx
@@ -242,7 +242,7 @@
           <a:p>
             <a:fld id="{8362D56F-4014-E440-B414-1949875DC54A}" type="datetimeFigureOut">
               <a:rPr lang="en-US" smtClean="0"/>
-              <a:t>9/7/2021</a:t>
+              <a:t>9/20/2021</a:t>
             </a:fld>
             <a:endParaRPr lang="en-US"/>
           </a:p>
@@ -419,7 +419,7 @@
           <a:p>
             <a:fld id="{1EAC332E-8893-FE4E-9A25-93BB30EFA0DA}" type="datetimeFigureOut">
               <a:rPr lang="en-US" smtClean="0"/>
-              <a:t>9/7/2021</a:t>
+              <a:t>9/20/2021</a:t>
             </a:fld>
             <a:endParaRPr lang="en-US"/>
           </a:p>
@@ -2354,7 +2354,7 @@
                 <a:hlinkClick r:id="rId5">
                   <a:extLst>
                     <a:ext uri="{A12FA001-AC4F-418D-AE19-62706E023703}">
-                      <ahyp:hlinkClr xmlns:ahyp="http://schemas.microsoft.com/office/drawing/2018/hyperlinkcolor" xmlns="" val="tx"/>
+                      <ahyp:hlinkClr xmlns="" xmlns:ahyp="http://schemas.microsoft.com/office/drawing/2018/hyperlinkcolor" val="tx"/>
                     </a:ext>
                   </a:extLst>
                 </a:hlinkClick>
@@ -17554,27 +17554,6 @@
 </file>
 
 <file path=customXml/item1.xml><?xml version="1.0" encoding="utf-8"?>
-<p:properties xmlns:p="http://schemas.microsoft.com/office/2006/metadata/properties" xmlns:xsi="http://www.w3.org/2001/XMLSchema-instance" xmlns:pc="http://schemas.microsoft.com/office/infopath/2007/PartnerControls">
-  <documentManagement>
-    <_dlc_DocId xmlns="06814371-4dd9-40ea-9cc7-40b39613c6ae">T2EJA6NA5JU7-1903484182-91</_dlc_DocId>
-    <_dlc_DocIdUrl xmlns="06814371-4dd9-40ea-9cc7-40b39613c6ae">
-      <Url>https://iiasahub.sharepoint.com/sites/intranet/ercl/_layouts/15/DocIdRedir.aspx?ID=T2EJA6NA5JU7-1903484182-91</Url>
-      <Description>T2EJA6NA5JU7-1903484182-91</Description>
-    </_dlc_DocIdUrl>
-  </documentManagement>
-</p:properties>
-</file>
-
-<file path=customXml/item2.xml><?xml version="1.0" encoding="utf-8"?>
-<?mso-contentType ?>
-<FormTemplates xmlns="http://schemas.microsoft.com/sharepoint/v3/contenttype/forms">
-  <Display>DocumentLibraryForm</Display>
-  <Edit>DocumentLibraryForm</Edit>
-  <New>DocumentLibraryForm</New>
-</FormTemplates>
-</file>
-
-<file path=customXml/item3.xml><?xml version="1.0" encoding="utf-8"?>
 <?mso-contentType ?>
 <spe:Receivers xmlns:spe="http://schemas.microsoft.com/sharepoint/events">
   <Receiver>
@@ -17622,6 +17601,27 @@
     <Filter/>
   </Receiver>
 </spe:Receivers>
+</file>
+
+<file path=customXml/item2.xml><?xml version="1.0" encoding="utf-8"?>
+<?mso-contentType ?>
+<FormTemplates xmlns="http://schemas.microsoft.com/sharepoint/v3/contenttype/forms">
+  <Display>DocumentLibraryForm</Display>
+  <Edit>DocumentLibraryForm</Edit>
+  <New>DocumentLibraryForm</New>
+</FormTemplates>
+</file>
+
+<file path=customXml/item3.xml><?xml version="1.0" encoding="utf-8"?>
+<p:properties xmlns:p="http://schemas.microsoft.com/office/2006/metadata/properties" xmlns:xsi="http://www.w3.org/2001/XMLSchema-instance" xmlns:pc="http://schemas.microsoft.com/office/infopath/2007/PartnerControls">
+  <documentManagement>
+    <_dlc_DocId xmlns="06814371-4dd9-40ea-9cc7-40b39613c6ae">T2EJA6NA5JU7-1903484182-91</_dlc_DocId>
+    <_dlc_DocIdUrl xmlns="06814371-4dd9-40ea-9cc7-40b39613c6ae">
+      <Url>https://iiasahub.sharepoint.com/sites/intranet/ercl/_layouts/15/DocIdRedir.aspx?ID=T2EJA6NA5JU7-1903484182-91</Url>
+      <Description>T2EJA6NA5JU7-1903484182-91</Description>
+    </_dlc_DocIdUrl>
+  </documentManagement>
+</p:properties>
 </file>
 
 <file path=customXml/item4.xml><?xml version="1.0" encoding="utf-8"?>
@@ -17832,6 +17832,22 @@
 </file>
 
 <file path=customXml/itemProps1.xml><?xml version="1.0" encoding="utf-8"?>
+<ds:datastoreItem xmlns:ds="http://schemas.openxmlformats.org/officeDocument/2006/customXml" ds:itemID="{B0542633-460B-4F10-AED0-D9CC98DDA495}">
+  <ds:schemaRefs>
+    <ds:schemaRef ds:uri="http://schemas.microsoft.com/sharepoint/events"/>
+  </ds:schemaRefs>
+</ds:datastoreItem>
+</file>
+
+<file path=customXml/itemProps2.xml><?xml version="1.0" encoding="utf-8"?>
+<ds:datastoreItem xmlns:ds="http://schemas.openxmlformats.org/officeDocument/2006/customXml" ds:itemID="{6E794EA7-8E28-4624-885F-9EF05194D2E6}">
+  <ds:schemaRefs>
+    <ds:schemaRef ds:uri="http://schemas.microsoft.com/sharepoint/v3/contenttype/forms"/>
+  </ds:schemaRefs>
+</ds:datastoreItem>
+</file>
+
+<file path=customXml/itemProps3.xml><?xml version="1.0" encoding="utf-8"?>
 <ds:datastoreItem xmlns:ds="http://schemas.openxmlformats.org/officeDocument/2006/customXml" ds:itemID="{5AD93C57-A7ED-44E6-88BF-DA3984EE19E6}">
   <ds:schemaRefs>
     <ds:schemaRef ds:uri="http://schemas.microsoft.com/office/2006/documentManagement/types"/>
@@ -17845,22 +17861,6 @@
     <ds:schemaRef ds:uri="749ef8e9-4186-4c55-b2d4-b1c3f2fa9400"/>
     <ds:schemaRef ds:uri="06814371-4dd9-40ea-9cc7-40b39613c6ae"/>
     <ds:schemaRef ds:uri="http://www.w3.org/XML/1998/namespace"/>
-  </ds:schemaRefs>
-</ds:datastoreItem>
-</file>
-
-<file path=customXml/itemProps2.xml><?xml version="1.0" encoding="utf-8"?>
-<ds:datastoreItem xmlns:ds="http://schemas.openxmlformats.org/officeDocument/2006/customXml" ds:itemID="{6E794EA7-8E28-4624-885F-9EF05194D2E6}">
-  <ds:schemaRefs>
-    <ds:schemaRef ds:uri="http://schemas.microsoft.com/sharepoint/v3/contenttype/forms"/>
-  </ds:schemaRefs>
-</ds:datastoreItem>
-</file>
-
-<file path=customXml/itemProps3.xml><?xml version="1.0" encoding="utf-8"?>
-<ds:datastoreItem xmlns:ds="http://schemas.openxmlformats.org/officeDocument/2006/customXml" ds:itemID="{B0542633-460B-4F10-AED0-D9CC98DDA495}">
-  <ds:schemaRefs>
-    <ds:schemaRef ds:uri="http://schemas.microsoft.com/sharepoint/events"/>
   </ds:schemaRefs>
 </ds:datastoreItem>
 </file>

</xml_diff>